<commit_message>
Fix Move and colorPanel
</commit_message>
<xml_diff>
--- a/Report/Painter User Guide.pptx
+++ b/Report/Painter User Guide.pptx
@@ -12,6 +12,8 @@
     <p:sldId id="261" r:id="rId6"/>
     <p:sldId id="262" r:id="rId7"/>
     <p:sldId id="265" r:id="rId8"/>
+    <p:sldId id="267" r:id="rId9"/>
+    <p:sldId id="268" r:id="rId10"/>
   </p:sldIdLst>
   <p:sldSz cx="12192000" cy="6858000"/>
   <p:notesSz cx="6858000" cy="9144000"/>
@@ -110,6 +112,11 @@
       </a:defRPr>
     </a:lvl9pPr>
   </p:defaultTextStyle>
+  <p:extLst>
+    <p:ext uri="{EFAFB233-063F-42B5-8137-9DF3F51BA10A}">
+      <p15:sldGuideLst xmlns:p15="http://schemas.microsoft.com/office/powerpoint/2012/main"/>
+    </p:ext>
+  </p:extLst>
 </p:presentation>
 </file>
 
@@ -5095,6 +5102,509 @@
 </p:sld>
 </file>
 
+<file path=ppt/slides/slide8.xml><?xml version="1.0" encoding="utf-8"?>
+<p:sld xmlns:a="http://schemas.openxmlformats.org/drawingml/2006/main" xmlns:r="http://schemas.openxmlformats.org/officeDocument/2006/relationships" xmlns:p="http://schemas.openxmlformats.org/presentationml/2006/main">
+  <p:cSld>
+    <p:spTree>
+      <p:nvGrpSpPr>
+        <p:cNvPr id="1" name=""/>
+        <p:cNvGrpSpPr/>
+        <p:nvPr/>
+      </p:nvGrpSpPr>
+      <p:grpSpPr>
+        <a:xfrm>
+          <a:off x="0" y="0"/>
+          <a:ext cx="0" cy="0"/>
+          <a:chOff x="0" y="0"/>
+          <a:chExt cx="0" cy="0"/>
+        </a:xfrm>
+      </p:grpSpPr>
+      <p:pic>
+        <p:nvPicPr>
+          <p:cNvPr id="5" name="Picture 4"/>
+          <p:cNvPicPr>
+            <a:picLocks noChangeAspect="1"/>
+          </p:cNvPicPr>
+          <p:nvPr/>
+        </p:nvPicPr>
+        <p:blipFill>
+          <a:blip r:embed="rId2">
+            <a:extLst>
+              <a:ext uri="{28A0092B-C50C-407E-A947-70E740481C1C}">
+                <a14:useLocalDpi xmlns:a14="http://schemas.microsoft.com/office/drawing/2010/main" val="0"/>
+              </a:ext>
+            </a:extLst>
+          </a:blip>
+          <a:stretch>
+            <a:fillRect/>
+          </a:stretch>
+        </p:blipFill>
+        <p:spPr>
+          <a:xfrm>
+            <a:off x="1461884" y="862837"/>
+            <a:ext cx="142875" cy="142875"/>
+          </a:xfrm>
+          <a:prstGeom prst="rect">
+            <a:avLst/>
+          </a:prstGeom>
+        </p:spPr>
+      </p:pic>
+      <p:sp>
+        <p:nvSpPr>
+          <p:cNvPr id="28" name="TextBox 27"/>
+          <p:cNvSpPr txBox="1"/>
+          <p:nvPr/>
+        </p:nvSpPr>
+        <p:spPr>
+          <a:xfrm>
+            <a:off x="1604759" y="749608"/>
+            <a:ext cx="1184235" cy="369332"/>
+          </a:xfrm>
+          <a:prstGeom prst="rect">
+            <a:avLst/>
+          </a:prstGeom>
+          <a:noFill/>
+        </p:spPr>
+        <p:txBody>
+          <a:bodyPr wrap="none" rtlCol="0">
+            <a:spAutoFit/>
+          </a:bodyPr>
+          <a:lstStyle/>
+          <a:p>
+            <a:r>
+              <a:rPr lang="en-US" b="1" dirty="0" smtClean="0"/>
+              <a:t>Brush Tool</a:t>
+            </a:r>
+            <a:endParaRPr lang="en-US" b="1" dirty="0"/>
+          </a:p>
+        </p:txBody>
+      </p:sp>
+      <p:sp>
+        <p:nvSpPr>
+          <p:cNvPr id="29" name="TextBox 28"/>
+          <p:cNvSpPr txBox="1"/>
+          <p:nvPr/>
+        </p:nvSpPr>
+        <p:spPr>
+          <a:xfrm>
+            <a:off x="1604759" y="1118940"/>
+            <a:ext cx="3313343" cy="369332"/>
+          </a:xfrm>
+          <a:prstGeom prst="rect">
+            <a:avLst/>
+          </a:prstGeom>
+          <a:noFill/>
+        </p:spPr>
+        <p:txBody>
+          <a:bodyPr wrap="none" rtlCol="0">
+            <a:spAutoFit/>
+          </a:bodyPr>
+          <a:lstStyle/>
+          <a:p>
+            <a:r>
+              <a:rPr lang="en-US" dirty="0" smtClean="0"/>
+              <a:t>Used for changing Shape fill color</a:t>
+            </a:r>
+            <a:endParaRPr lang="en-US" dirty="0" smtClean="0"/>
+          </a:p>
+        </p:txBody>
+      </p:sp>
+      <p:sp>
+        <p:nvSpPr>
+          <p:cNvPr id="31" name="Rectangle 30"/>
+          <p:cNvSpPr/>
+          <p:nvPr/>
+        </p:nvSpPr>
+        <p:spPr>
+          <a:xfrm>
+            <a:off x="2305318" y="2327430"/>
+            <a:ext cx="7865624" cy="4330947"/>
+          </a:xfrm>
+          <a:prstGeom prst="rect">
+            <a:avLst/>
+          </a:prstGeom>
+          <a:noFill/>
+        </p:spPr>
+        <p:style>
+          <a:lnRef idx="2">
+            <a:schemeClr val="accent1">
+              <a:shade val="50000"/>
+            </a:schemeClr>
+          </a:lnRef>
+          <a:fillRef idx="1">
+            <a:schemeClr val="accent1"/>
+          </a:fillRef>
+          <a:effectRef idx="0">
+            <a:schemeClr val="accent1"/>
+          </a:effectRef>
+          <a:fontRef idx="minor">
+            <a:schemeClr val="lt1"/>
+          </a:fontRef>
+        </p:style>
+        <p:txBody>
+          <a:bodyPr rtlCol="0" anchor="ctr"/>
+          <a:lstStyle/>
+          <a:p>
+            <a:pPr algn="ctr"/>
+            <a:endParaRPr lang="en-US"/>
+          </a:p>
+        </p:txBody>
+      </p:sp>
+      <p:pic>
+        <p:nvPicPr>
+          <p:cNvPr id="32" name="Picture 31"/>
+          <p:cNvPicPr>
+            <a:picLocks noChangeAspect="1"/>
+          </p:cNvPicPr>
+          <p:nvPr/>
+        </p:nvPicPr>
+        <p:blipFill>
+          <a:blip r:embed="rId3"/>
+          <a:stretch>
+            <a:fillRect/>
+          </a:stretch>
+        </p:blipFill>
+        <p:spPr>
+          <a:xfrm>
+            <a:off x="405251" y="740385"/>
+            <a:ext cx="352425" cy="5095875"/>
+          </a:xfrm>
+          <a:prstGeom prst="rect">
+            <a:avLst/>
+          </a:prstGeom>
+        </p:spPr>
+      </p:pic>
+      <p:sp>
+        <p:nvSpPr>
+          <p:cNvPr id="4" name="Rectangle 3"/>
+          <p:cNvSpPr/>
+          <p:nvPr/>
+        </p:nvSpPr>
+        <p:spPr>
+          <a:xfrm>
+            <a:off x="5672430" y="749608"/>
+            <a:ext cx="6096000" cy="1200329"/>
+          </a:xfrm>
+          <a:prstGeom prst="rect">
+            <a:avLst/>
+          </a:prstGeom>
+        </p:spPr>
+        <p:txBody>
+          <a:bodyPr>
+            <a:spAutoFit/>
+          </a:bodyPr>
+          <a:lstStyle/>
+          <a:p>
+            <a:r>
+              <a:rPr lang="en-US" b="1" dirty="0" smtClean="0"/>
+              <a:t>To </a:t>
+            </a:r>
+            <a:r>
+              <a:rPr lang="en-US" b="1" dirty="0" smtClean="0"/>
+              <a:t>change shape color:</a:t>
+            </a:r>
+            <a:endParaRPr lang="en-US" b="1" dirty="0" smtClean="0"/>
+          </a:p>
+          <a:p>
+            <a:pPr marL="285750" indent="-285750">
+              <a:buFontTx/>
+              <a:buChar char="-"/>
+            </a:pPr>
+            <a:r>
+              <a:rPr lang="en-US" dirty="0" smtClean="0"/>
+              <a:t>Choose a color from Fill tool</a:t>
+            </a:r>
+            <a:endParaRPr lang="en-US" dirty="0" smtClean="0"/>
+          </a:p>
+          <a:p>
+            <a:pPr marL="285750" indent="-285750">
+              <a:buFontTx/>
+              <a:buChar char="-"/>
+            </a:pPr>
+            <a:r>
+              <a:rPr lang="en-US" dirty="0" smtClean="0"/>
+              <a:t>Press anywhere within shape boundaries</a:t>
+            </a:r>
+          </a:p>
+          <a:p>
+            <a:pPr marL="285750" indent="-285750">
+              <a:buFontTx/>
+              <a:buChar char="-"/>
+            </a:pPr>
+            <a:r>
+              <a:rPr lang="en-US" dirty="0" smtClean="0"/>
+              <a:t>Recolor Shape fill</a:t>
+            </a:r>
+            <a:endParaRPr lang="en-US" dirty="0"/>
+          </a:p>
+        </p:txBody>
+      </p:sp>
+      <p:sp>
+        <p:nvSpPr>
+          <p:cNvPr id="11" name="Rectangle 10"/>
+          <p:cNvSpPr/>
+          <p:nvPr/>
+        </p:nvSpPr>
+        <p:spPr>
+          <a:xfrm>
+            <a:off x="0" y="0"/>
+            <a:ext cx="267286" cy="6858000"/>
+          </a:xfrm>
+          <a:prstGeom prst="rect">
+            <a:avLst/>
+          </a:prstGeom>
+          <a:solidFill>
+            <a:srgbClr val="579897"/>
+          </a:solidFill>
+          <a:ln>
+            <a:noFill/>
+          </a:ln>
+        </p:spPr>
+        <p:style>
+          <a:lnRef idx="2">
+            <a:schemeClr val="accent1">
+              <a:shade val="50000"/>
+            </a:schemeClr>
+          </a:lnRef>
+          <a:fillRef idx="1">
+            <a:schemeClr val="accent1"/>
+          </a:fillRef>
+          <a:effectRef idx="0">
+            <a:schemeClr val="accent1"/>
+          </a:effectRef>
+          <a:fontRef idx="minor">
+            <a:schemeClr val="lt1"/>
+          </a:fontRef>
+        </p:style>
+        <p:txBody>
+          <a:bodyPr rtlCol="0" anchor="ctr"/>
+          <a:lstStyle/>
+          <a:p>
+            <a:pPr algn="ctr"/>
+            <a:endParaRPr lang="en-US"/>
+          </a:p>
+        </p:txBody>
+      </p:sp>
+      <p:pic>
+        <p:nvPicPr>
+          <p:cNvPr id="2" name="Picture 1"/>
+          <p:cNvPicPr>
+            <a:picLocks noChangeAspect="1"/>
+          </p:cNvPicPr>
+          <p:nvPr/>
+        </p:nvPicPr>
+        <p:blipFill>
+          <a:blip r:embed="rId4">
+            <a:extLst>
+              <a:ext uri="{28A0092B-C50C-407E-A947-70E740481C1C}">
+                <a14:useLocalDpi xmlns:a14="http://schemas.microsoft.com/office/drawing/2010/main" val="0"/>
+              </a:ext>
+            </a:extLst>
+          </a:blip>
+          <a:stretch>
+            <a:fillRect/>
+          </a:stretch>
+        </p:blipFill>
+        <p:spPr>
+          <a:xfrm>
+            <a:off x="2450416" y="2462913"/>
+            <a:ext cx="7581900" cy="4038600"/>
+          </a:xfrm>
+          <a:prstGeom prst="rect">
+            <a:avLst/>
+          </a:prstGeom>
+        </p:spPr>
+      </p:pic>
+    </p:spTree>
+    <p:extLst>
+      <p:ext uri="{BB962C8B-B14F-4D97-AF65-F5344CB8AC3E}">
+        <p14:creationId xmlns:p14="http://schemas.microsoft.com/office/powerpoint/2010/main" val="1998406964"/>
+      </p:ext>
+    </p:extLst>
+  </p:cSld>
+  <p:clrMapOvr>
+    <a:masterClrMapping/>
+  </p:clrMapOvr>
+  <p:timing>
+    <p:tnLst>
+      <p:par>
+        <p:cTn id="1" dur="indefinite" restart="never" nodeType="tmRoot"/>
+      </p:par>
+    </p:tnLst>
+  </p:timing>
+</p:sld>
+</file>
+
+<file path=ppt/slides/slide9.xml><?xml version="1.0" encoding="utf-8"?>
+<p:sld xmlns:a="http://schemas.openxmlformats.org/drawingml/2006/main" xmlns:r="http://schemas.openxmlformats.org/officeDocument/2006/relationships" xmlns:p="http://schemas.openxmlformats.org/presentationml/2006/main">
+  <p:cSld>
+    <p:spTree>
+      <p:nvGrpSpPr>
+        <p:cNvPr id="1" name=""/>
+        <p:cNvGrpSpPr/>
+        <p:nvPr/>
+      </p:nvGrpSpPr>
+      <p:grpSpPr>
+        <a:xfrm>
+          <a:off x="0" y="0"/>
+          <a:ext cx="0" cy="0"/>
+          <a:chOff x="0" y="0"/>
+          <a:chExt cx="0" cy="0"/>
+        </a:xfrm>
+      </p:grpSpPr>
+      <p:sp>
+        <p:nvSpPr>
+          <p:cNvPr id="4" name="Rectangle 3"/>
+          <p:cNvSpPr/>
+          <p:nvPr/>
+        </p:nvSpPr>
+        <p:spPr>
+          <a:xfrm>
+            <a:off x="0" y="0"/>
+            <a:ext cx="267286" cy="6858000"/>
+          </a:xfrm>
+          <a:prstGeom prst="rect">
+            <a:avLst/>
+          </a:prstGeom>
+          <a:solidFill>
+            <a:srgbClr val="579897"/>
+          </a:solidFill>
+          <a:ln>
+            <a:noFill/>
+          </a:ln>
+        </p:spPr>
+        <p:style>
+          <a:lnRef idx="2">
+            <a:schemeClr val="accent1">
+              <a:shade val="50000"/>
+            </a:schemeClr>
+          </a:lnRef>
+          <a:fillRef idx="1">
+            <a:schemeClr val="accent1"/>
+          </a:fillRef>
+          <a:effectRef idx="0">
+            <a:schemeClr val="accent1"/>
+          </a:effectRef>
+          <a:fontRef idx="minor">
+            <a:schemeClr val="lt1"/>
+          </a:fontRef>
+        </p:style>
+        <p:txBody>
+          <a:bodyPr rtlCol="0" anchor="ctr"/>
+          <a:lstStyle/>
+          <a:p>
+            <a:pPr algn="ctr"/>
+            <a:endParaRPr lang="en-US"/>
+          </a:p>
+        </p:txBody>
+      </p:sp>
+      <p:sp>
+        <p:nvSpPr>
+          <p:cNvPr id="5" name="TextBox 4"/>
+          <p:cNvSpPr txBox="1"/>
+          <p:nvPr/>
+        </p:nvSpPr>
+        <p:spPr>
+          <a:xfrm>
+            <a:off x="2189408" y="2370338"/>
+            <a:ext cx="3422732" cy="1477328"/>
+          </a:xfrm>
+          <a:prstGeom prst="rect">
+            <a:avLst/>
+          </a:prstGeom>
+          <a:noFill/>
+        </p:spPr>
+        <p:txBody>
+          <a:bodyPr wrap="none" rtlCol="0">
+            <a:spAutoFit/>
+          </a:bodyPr>
+          <a:lstStyle/>
+          <a:p>
+            <a:r>
+              <a:rPr lang="en-US" dirty="0" smtClean="0"/>
+              <a:t>Ahmed </a:t>
+            </a:r>
+            <a:r>
+              <a:rPr lang="en-US" dirty="0" err="1" smtClean="0"/>
+              <a:t>Magdy</a:t>
+            </a:r>
+            <a:r>
+              <a:rPr lang="en-US" dirty="0" smtClean="0"/>
+              <a:t> 		3003</a:t>
+            </a:r>
+          </a:p>
+          <a:p>
+            <a:endParaRPr lang="en-US" dirty="0" smtClean="0"/>
+          </a:p>
+          <a:p>
+            <a:r>
+              <a:rPr lang="en-US" dirty="0" err="1" smtClean="0"/>
+              <a:t>Doaa</a:t>
+            </a:r>
+            <a:r>
+              <a:rPr lang="en-US" dirty="0" smtClean="0"/>
+              <a:t> Fouad		2844</a:t>
+            </a:r>
+          </a:p>
+          <a:p>
+            <a:endParaRPr lang="en-US" dirty="0" smtClean="0"/>
+          </a:p>
+          <a:p>
+            <a:r>
+              <a:rPr lang="en-US" dirty="0" smtClean="0"/>
+              <a:t>Dina Nashaat 		3124</a:t>
+            </a:r>
+          </a:p>
+        </p:txBody>
+      </p:sp>
+      <p:cxnSp>
+        <p:nvCxnSpPr>
+          <p:cNvPr id="7" name="Straight Connector 6"/>
+          <p:cNvCxnSpPr/>
+          <p:nvPr/>
+        </p:nvCxnSpPr>
+        <p:spPr>
+          <a:xfrm>
+            <a:off x="2099256" y="1983346"/>
+            <a:ext cx="0" cy="2472744"/>
+          </a:xfrm>
+          <a:prstGeom prst="line">
+            <a:avLst/>
+          </a:prstGeom>
+          <a:ln>
+            <a:solidFill>
+              <a:srgbClr val="579897"/>
+            </a:solidFill>
+          </a:ln>
+        </p:spPr>
+        <p:style>
+          <a:lnRef idx="1">
+            <a:schemeClr val="accent1"/>
+          </a:lnRef>
+          <a:fillRef idx="0">
+            <a:schemeClr val="accent1"/>
+          </a:fillRef>
+          <a:effectRef idx="0">
+            <a:schemeClr val="accent1"/>
+          </a:effectRef>
+          <a:fontRef idx="minor">
+            <a:schemeClr val="tx1"/>
+          </a:fontRef>
+        </p:style>
+      </p:cxnSp>
+    </p:spTree>
+    <p:extLst>
+      <p:ext uri="{BB962C8B-B14F-4D97-AF65-F5344CB8AC3E}">
+        <p14:creationId xmlns:p14="http://schemas.microsoft.com/office/powerpoint/2010/main" val="133001953"/>
+      </p:ext>
+    </p:extLst>
+  </p:cSld>
+  <p:clrMapOvr>
+    <a:masterClrMapping/>
+  </p:clrMapOvr>
+</p:sld>
+</file>
+
 <file path=ppt/theme/theme1.xml><?xml version="1.0" encoding="utf-8"?>
 <a:theme xmlns:a="http://schemas.openxmlformats.org/drawingml/2006/main" name="Office Theme">
   <a:themeElements>

</xml_diff>